<commit_message>
200420_17 hashmap 부분 전부 삭제
</commit_message>
<xml_diff>
--- a/JavaBasic/src/t_teamproject/teamproject_02/document/화면설계서.pptx
+++ b/JavaBasic/src/t_teamproject/teamproject_02/document/화면설계서.pptx
@@ -263,7 +263,7 @@
           <a:p>
             <a:fld id="{64DD7884-5903-414B-95E9-D8F82DA7F288}" type="datetimeFigureOut">
               <a:rPr lang="ko-KR" altLang="en-US" smtClean="0"/>
-              <a:t>2020-04-18</a:t>
+              <a:t>2020-04-20</a:t>
             </a:fld>
             <a:endParaRPr lang="ko-KR" altLang="en-US"/>
           </a:p>
@@ -461,7 +461,7 @@
           <a:p>
             <a:fld id="{64DD7884-5903-414B-95E9-D8F82DA7F288}" type="datetimeFigureOut">
               <a:rPr lang="ko-KR" altLang="en-US" smtClean="0"/>
-              <a:t>2020-04-18</a:t>
+              <a:t>2020-04-20</a:t>
             </a:fld>
             <a:endParaRPr lang="ko-KR" altLang="en-US"/>
           </a:p>
@@ -669,7 +669,7 @@
           <a:p>
             <a:fld id="{64DD7884-5903-414B-95E9-D8F82DA7F288}" type="datetimeFigureOut">
               <a:rPr lang="ko-KR" altLang="en-US" smtClean="0"/>
-              <a:t>2020-04-18</a:t>
+              <a:t>2020-04-20</a:t>
             </a:fld>
             <a:endParaRPr lang="ko-KR" altLang="en-US"/>
           </a:p>
@@ -867,7 +867,7 @@
           <a:p>
             <a:fld id="{64DD7884-5903-414B-95E9-D8F82DA7F288}" type="datetimeFigureOut">
               <a:rPr lang="ko-KR" altLang="en-US" smtClean="0"/>
-              <a:t>2020-04-18</a:t>
+              <a:t>2020-04-20</a:t>
             </a:fld>
             <a:endParaRPr lang="ko-KR" altLang="en-US"/>
           </a:p>
@@ -1142,7 +1142,7 @@
           <a:p>
             <a:fld id="{64DD7884-5903-414B-95E9-D8F82DA7F288}" type="datetimeFigureOut">
               <a:rPr lang="ko-KR" altLang="en-US" smtClean="0"/>
-              <a:t>2020-04-18</a:t>
+              <a:t>2020-04-20</a:t>
             </a:fld>
             <a:endParaRPr lang="ko-KR" altLang="en-US"/>
           </a:p>
@@ -1407,7 +1407,7 @@
           <a:p>
             <a:fld id="{64DD7884-5903-414B-95E9-D8F82DA7F288}" type="datetimeFigureOut">
               <a:rPr lang="ko-KR" altLang="en-US" smtClean="0"/>
-              <a:t>2020-04-18</a:t>
+              <a:t>2020-04-20</a:t>
             </a:fld>
             <a:endParaRPr lang="ko-KR" altLang="en-US"/>
           </a:p>
@@ -1819,7 +1819,7 @@
           <a:p>
             <a:fld id="{64DD7884-5903-414B-95E9-D8F82DA7F288}" type="datetimeFigureOut">
               <a:rPr lang="ko-KR" altLang="en-US" smtClean="0"/>
-              <a:t>2020-04-18</a:t>
+              <a:t>2020-04-20</a:t>
             </a:fld>
             <a:endParaRPr lang="ko-KR" altLang="en-US"/>
           </a:p>
@@ -1960,7 +1960,7 @@
           <a:p>
             <a:fld id="{64DD7884-5903-414B-95E9-D8F82DA7F288}" type="datetimeFigureOut">
               <a:rPr lang="ko-KR" altLang="en-US" smtClean="0"/>
-              <a:t>2020-04-18</a:t>
+              <a:t>2020-04-20</a:t>
             </a:fld>
             <a:endParaRPr lang="ko-KR" altLang="en-US"/>
           </a:p>
@@ -2073,7 +2073,7 @@
           <a:p>
             <a:fld id="{64DD7884-5903-414B-95E9-D8F82DA7F288}" type="datetimeFigureOut">
               <a:rPr lang="ko-KR" altLang="en-US" smtClean="0"/>
-              <a:t>2020-04-18</a:t>
+              <a:t>2020-04-20</a:t>
             </a:fld>
             <a:endParaRPr lang="ko-KR" altLang="en-US"/>
           </a:p>
@@ -2384,7 +2384,7 @@
           <a:p>
             <a:fld id="{64DD7884-5903-414B-95E9-D8F82DA7F288}" type="datetimeFigureOut">
               <a:rPr lang="ko-KR" altLang="en-US" smtClean="0"/>
-              <a:t>2020-04-18</a:t>
+              <a:t>2020-04-20</a:t>
             </a:fld>
             <a:endParaRPr lang="ko-KR" altLang="en-US"/>
           </a:p>
@@ -2672,7 +2672,7 @@
           <a:p>
             <a:fld id="{64DD7884-5903-414B-95E9-D8F82DA7F288}" type="datetimeFigureOut">
               <a:rPr lang="ko-KR" altLang="en-US" smtClean="0"/>
-              <a:t>2020-04-18</a:t>
+              <a:t>2020-04-20</a:t>
             </a:fld>
             <a:endParaRPr lang="ko-KR" altLang="en-US"/>
           </a:p>
@@ -2913,7 +2913,7 @@
           <a:p>
             <a:fld id="{64DD7884-5903-414B-95E9-D8F82DA7F288}" type="datetimeFigureOut">
               <a:rPr lang="ko-KR" altLang="en-US" smtClean="0"/>
-              <a:t>2020-04-18</a:t>
+              <a:t>2020-04-20</a:t>
             </a:fld>
             <a:endParaRPr lang="ko-KR" altLang="en-US"/>
           </a:p>
@@ -5166,50 +5166,350 @@
       </p:grpSpPr>
       <p:sp>
         <p:nvSpPr>
-          <p:cNvPr id="2" name="제목 1">
-            <a:extLst>
-              <a:ext uri="{FF2B5EF4-FFF2-40B4-BE49-F238E27FC236}">
-                <a16:creationId xmlns:a16="http://schemas.microsoft.com/office/drawing/2014/main" id="{B04EFD46-14E8-4ACA-8EC9-894B93E61C98}"/>
-              </a:ext>
-            </a:extLst>
-          </p:cNvPr>
-          <p:cNvSpPr>
-            <a:spLocks noGrp="1"/>
-          </p:cNvSpPr>
-          <p:nvPr>
-            <p:ph type="title"/>
-          </p:nvPr>
-        </p:nvSpPr>
-        <p:spPr/>
-        <p:txBody>
-          <a:bodyPr/>
-          <a:lstStyle/>
-          <a:p>
+          <p:cNvPr id="4" name="직사각형 3">
+            <a:extLst>
+              <a:ext uri="{FF2B5EF4-FFF2-40B4-BE49-F238E27FC236}">
+                <a16:creationId xmlns:a16="http://schemas.microsoft.com/office/drawing/2014/main" id="{F8209DD8-318B-4E7B-A52D-7E45DA663AAC}"/>
+              </a:ext>
+            </a:extLst>
+          </p:cNvPr>
+          <p:cNvSpPr/>
+          <p:nvPr/>
+        </p:nvSpPr>
+        <p:spPr>
+          <a:xfrm>
+            <a:off x="762000" y="820615"/>
+            <a:ext cx="10937631" cy="5615354"/>
+          </a:xfrm>
+          <a:prstGeom prst="rect">
+            <a:avLst/>
+          </a:prstGeom>
+        </p:spPr>
+        <p:style>
+          <a:lnRef idx="2">
+            <a:schemeClr val="accent1">
+              <a:shade val="50000"/>
+            </a:schemeClr>
+          </a:lnRef>
+          <a:fillRef idx="1">
+            <a:schemeClr val="accent1"/>
+          </a:fillRef>
+          <a:effectRef idx="0">
+            <a:schemeClr val="accent1"/>
+          </a:effectRef>
+          <a:fontRef idx="minor">
+            <a:schemeClr val="lt1"/>
+          </a:fontRef>
+        </p:style>
+        <p:txBody>
+          <a:bodyPr rtlCol="0" anchor="ctr"/>
+          <a:lstStyle/>
+          <a:p>
+            <a:pPr algn="ctr"/>
             <a:endParaRPr lang="ko-KR" altLang="en-US"/>
           </a:p>
         </p:txBody>
       </p:sp>
       <p:sp>
         <p:nvSpPr>
-          <p:cNvPr id="3" name="내용 개체 틀 2">
-            <a:extLst>
-              <a:ext uri="{FF2B5EF4-FFF2-40B4-BE49-F238E27FC236}">
-                <a16:creationId xmlns:a16="http://schemas.microsoft.com/office/drawing/2014/main" id="{4F250F43-D701-46A5-8F55-E60100998797}"/>
-              </a:ext>
-            </a:extLst>
-          </p:cNvPr>
-          <p:cNvSpPr>
-            <a:spLocks noGrp="1"/>
-          </p:cNvSpPr>
-          <p:nvPr>
-            <p:ph idx="1"/>
-          </p:nvPr>
-        </p:nvSpPr>
-        <p:spPr/>
-        <p:txBody>
-          <a:bodyPr/>
-          <a:lstStyle/>
-          <a:p>
+          <p:cNvPr id="5" name="직사각형 4">
+            <a:extLst>
+              <a:ext uri="{FF2B5EF4-FFF2-40B4-BE49-F238E27FC236}">
+                <a16:creationId xmlns:a16="http://schemas.microsoft.com/office/drawing/2014/main" id="{D0D4FC7E-B02E-4782-8F62-165F84636D74}"/>
+              </a:ext>
+            </a:extLst>
+          </p:cNvPr>
+          <p:cNvSpPr/>
+          <p:nvPr/>
+        </p:nvSpPr>
+        <p:spPr>
+          <a:xfrm>
+            <a:off x="996463" y="1008185"/>
+            <a:ext cx="8229600" cy="5029200"/>
+          </a:xfrm>
+          <a:prstGeom prst="rect">
+            <a:avLst/>
+          </a:prstGeom>
+          <a:solidFill>
+            <a:schemeClr val="bg1"/>
+          </a:solidFill>
+        </p:spPr>
+        <p:style>
+          <a:lnRef idx="2">
+            <a:schemeClr val="accent1">
+              <a:shade val="50000"/>
+            </a:schemeClr>
+          </a:lnRef>
+          <a:fillRef idx="1">
+            <a:schemeClr val="accent1"/>
+          </a:fillRef>
+          <a:effectRef idx="0">
+            <a:schemeClr val="accent1"/>
+          </a:effectRef>
+          <a:fontRef idx="minor">
+            <a:schemeClr val="lt1"/>
+          </a:fontRef>
+        </p:style>
+        <p:txBody>
+          <a:bodyPr rtlCol="0" anchor="ctr"/>
+          <a:lstStyle/>
+          <a:p>
+            <a:pPr algn="ctr"/>
+            <a:endParaRPr lang="ko-KR" altLang="en-US"/>
+          </a:p>
+        </p:txBody>
+      </p:sp>
+      <p:sp>
+        <p:nvSpPr>
+          <p:cNvPr id="6" name="직사각형 5">
+            <a:extLst>
+              <a:ext uri="{FF2B5EF4-FFF2-40B4-BE49-F238E27FC236}">
+                <a16:creationId xmlns:a16="http://schemas.microsoft.com/office/drawing/2014/main" id="{6D74CDC9-6551-48B0-8EA0-39B63B2A2196}"/>
+              </a:ext>
+            </a:extLst>
+          </p:cNvPr>
+          <p:cNvSpPr/>
+          <p:nvPr/>
+        </p:nvSpPr>
+        <p:spPr>
+          <a:xfrm>
+            <a:off x="9378462" y="1008185"/>
+            <a:ext cx="2215661" cy="5029200"/>
+          </a:xfrm>
+          <a:prstGeom prst="rect">
+            <a:avLst/>
+          </a:prstGeom>
+          <a:solidFill>
+            <a:schemeClr val="bg1"/>
+          </a:solidFill>
+        </p:spPr>
+        <p:style>
+          <a:lnRef idx="2">
+            <a:schemeClr val="accent1">
+              <a:shade val="50000"/>
+            </a:schemeClr>
+          </a:lnRef>
+          <a:fillRef idx="1">
+            <a:schemeClr val="accent1"/>
+          </a:fillRef>
+          <a:effectRef idx="0">
+            <a:schemeClr val="accent1"/>
+          </a:effectRef>
+          <a:fontRef idx="minor">
+            <a:schemeClr val="lt1"/>
+          </a:fontRef>
+        </p:style>
+        <p:txBody>
+          <a:bodyPr rtlCol="0" anchor="ctr"/>
+          <a:lstStyle/>
+          <a:p>
+            <a:pPr algn="ctr"/>
+            <a:endParaRPr lang="ko-KR" altLang="en-US"/>
+          </a:p>
+        </p:txBody>
+      </p:sp>
+      <p:sp>
+        <p:nvSpPr>
+          <p:cNvPr id="7" name="직사각형 6">
+            <a:extLst>
+              <a:ext uri="{FF2B5EF4-FFF2-40B4-BE49-F238E27FC236}">
+                <a16:creationId xmlns:a16="http://schemas.microsoft.com/office/drawing/2014/main" id="{17753CC7-7EF5-41A5-9439-5DB847973943}"/>
+              </a:ext>
+            </a:extLst>
+          </p:cNvPr>
+          <p:cNvSpPr/>
+          <p:nvPr/>
+        </p:nvSpPr>
+        <p:spPr>
+          <a:xfrm>
+            <a:off x="9378462" y="1113692"/>
+            <a:ext cx="2215661" cy="363416"/>
+          </a:xfrm>
+          <a:prstGeom prst="rect">
+            <a:avLst/>
+          </a:prstGeom>
+        </p:spPr>
+        <p:style>
+          <a:lnRef idx="2">
+            <a:schemeClr val="accent1">
+              <a:shade val="50000"/>
+            </a:schemeClr>
+          </a:lnRef>
+          <a:fillRef idx="1">
+            <a:schemeClr val="accent1"/>
+          </a:fillRef>
+          <a:effectRef idx="0">
+            <a:schemeClr val="accent1"/>
+          </a:effectRef>
+          <a:fontRef idx="minor">
+            <a:schemeClr val="lt1"/>
+          </a:fontRef>
+        </p:style>
+        <p:txBody>
+          <a:bodyPr rtlCol="0" anchor="ctr"/>
+          <a:lstStyle/>
+          <a:p>
+            <a:pPr algn="ctr"/>
+            <a:r>
+              <a:rPr lang="ko-KR" altLang="en-US" dirty="0"/>
+              <a:t>레이블</a:t>
+            </a:r>
+          </a:p>
+        </p:txBody>
+      </p:sp>
+      <p:sp>
+        <p:nvSpPr>
+          <p:cNvPr id="8" name="직사각형 7">
+            <a:extLst>
+              <a:ext uri="{FF2B5EF4-FFF2-40B4-BE49-F238E27FC236}">
+                <a16:creationId xmlns:a16="http://schemas.microsoft.com/office/drawing/2014/main" id="{B80D9965-EC07-4347-9031-6FD4FE6D90F3}"/>
+              </a:ext>
+            </a:extLst>
+          </p:cNvPr>
+          <p:cNvSpPr/>
+          <p:nvPr/>
+        </p:nvSpPr>
+        <p:spPr>
+          <a:xfrm>
+            <a:off x="9378461" y="1582615"/>
+            <a:ext cx="2215661" cy="3985847"/>
+          </a:xfrm>
+          <a:prstGeom prst="rect">
+            <a:avLst/>
+          </a:prstGeom>
+        </p:spPr>
+        <p:style>
+          <a:lnRef idx="2">
+            <a:schemeClr val="accent1">
+              <a:shade val="50000"/>
+            </a:schemeClr>
+          </a:lnRef>
+          <a:fillRef idx="1">
+            <a:schemeClr val="accent1"/>
+          </a:fillRef>
+          <a:effectRef idx="0">
+            <a:schemeClr val="accent1"/>
+          </a:effectRef>
+          <a:fontRef idx="minor">
+            <a:schemeClr val="lt1"/>
+          </a:fontRef>
+        </p:style>
+        <p:txBody>
+          <a:bodyPr rtlCol="0" anchor="ctr"/>
+          <a:lstStyle/>
+          <a:p>
+            <a:pPr algn="ctr"/>
+            <a:r>
+              <a:rPr lang="en-US" altLang="ko-KR" dirty="0" err="1"/>
+              <a:t>jlist</a:t>
+            </a:r>
+            <a:r>
+              <a:rPr lang="en-US" altLang="ko-KR" dirty="0"/>
+              <a:t> (panel)</a:t>
+            </a:r>
+            <a:r>
+              <a:rPr lang="ko-KR" altLang="en-US" dirty="0"/>
+              <a:t>로</a:t>
+            </a:r>
+            <a:r>
+              <a:rPr lang="en-US" altLang="ko-KR" dirty="0"/>
+              <a:t> </a:t>
+            </a:r>
+            <a:r>
+              <a:rPr lang="ko-KR" altLang="en-US" dirty="0"/>
+              <a:t>감싸기</a:t>
+            </a:r>
+          </a:p>
+        </p:txBody>
+      </p:sp>
+      <p:sp>
+        <p:nvSpPr>
+          <p:cNvPr id="9" name="직사각형 8">
+            <a:extLst>
+              <a:ext uri="{FF2B5EF4-FFF2-40B4-BE49-F238E27FC236}">
+                <a16:creationId xmlns:a16="http://schemas.microsoft.com/office/drawing/2014/main" id="{A037B32C-EEB6-49DE-89EB-C4AC6900824B}"/>
+              </a:ext>
+            </a:extLst>
+          </p:cNvPr>
+          <p:cNvSpPr/>
+          <p:nvPr/>
+        </p:nvSpPr>
+        <p:spPr>
+          <a:xfrm>
+            <a:off x="9495692" y="5662246"/>
+            <a:ext cx="902677" cy="281354"/>
+          </a:xfrm>
+          <a:prstGeom prst="rect">
+            <a:avLst/>
+          </a:prstGeom>
+        </p:spPr>
+        <p:style>
+          <a:lnRef idx="2">
+            <a:schemeClr val="accent1">
+              <a:shade val="50000"/>
+            </a:schemeClr>
+          </a:lnRef>
+          <a:fillRef idx="1">
+            <a:schemeClr val="accent1"/>
+          </a:fillRef>
+          <a:effectRef idx="0">
+            <a:schemeClr val="accent1"/>
+          </a:effectRef>
+          <a:fontRef idx="minor">
+            <a:schemeClr val="lt1"/>
+          </a:fontRef>
+        </p:style>
+        <p:txBody>
+          <a:bodyPr rtlCol="0" anchor="ctr"/>
+          <a:lstStyle/>
+          <a:p>
+            <a:pPr algn="ctr"/>
+            <a:endParaRPr lang="ko-KR" altLang="en-US"/>
+          </a:p>
+        </p:txBody>
+      </p:sp>
+      <p:sp>
+        <p:nvSpPr>
+          <p:cNvPr id="10" name="직사각형 9">
+            <a:extLst>
+              <a:ext uri="{FF2B5EF4-FFF2-40B4-BE49-F238E27FC236}">
+                <a16:creationId xmlns:a16="http://schemas.microsoft.com/office/drawing/2014/main" id="{F6F9EE74-6227-4FCD-8837-3F8B54BB3CA2}"/>
+              </a:ext>
+            </a:extLst>
+          </p:cNvPr>
+          <p:cNvSpPr/>
+          <p:nvPr/>
+        </p:nvSpPr>
+        <p:spPr>
+          <a:xfrm>
+            <a:off x="10544907" y="5662246"/>
+            <a:ext cx="902677" cy="281354"/>
+          </a:xfrm>
+          <a:prstGeom prst="rect">
+            <a:avLst/>
+          </a:prstGeom>
+        </p:spPr>
+        <p:style>
+          <a:lnRef idx="2">
+            <a:schemeClr val="accent1">
+              <a:shade val="50000"/>
+            </a:schemeClr>
+          </a:lnRef>
+          <a:fillRef idx="1">
+            <a:schemeClr val="accent1"/>
+          </a:fillRef>
+          <a:effectRef idx="0">
+            <a:schemeClr val="accent1"/>
+          </a:effectRef>
+          <a:fontRef idx="minor">
+            <a:schemeClr val="lt1"/>
+          </a:fontRef>
+        </p:style>
+        <p:txBody>
+          <a:bodyPr rtlCol="0" anchor="ctr"/>
+          <a:lstStyle/>
+          <a:p>
+            <a:pPr algn="ctr"/>
             <a:endParaRPr lang="ko-KR" altLang="en-US"/>
           </a:p>
         </p:txBody>

</xml_diff>